<commit_message>
it looks like final project completed.
</commit_message>
<xml_diff>
--- a/Final_project_presentation.pptx
+++ b/Final_project_presentation.pptx
@@ -309,7 +309,7 @@
           <a:p>
             <a:fld id="{040172E9-3018-4399-AF48-14950ACD53D7}" type="datetimeFigureOut">
               <a:rPr lang="en-US" smtClean="0"/>
-              <a:t>7/19/2022</a:t>
+              <a:t>7/24/2022</a:t>
             </a:fld>
             <a:endParaRPr lang="en-US"/>
           </a:p>
@@ -745,7 +745,7 @@
           <a:p>
             <a:fld id="{040172E9-3018-4399-AF48-14950ACD53D7}" type="datetimeFigureOut">
               <a:rPr lang="en-US" smtClean="0"/>
-              <a:t>7/19/2022</a:t>
+              <a:t>7/24/2022</a:t>
             </a:fld>
             <a:endParaRPr lang="en-US"/>
           </a:p>
@@ -995,7 +995,7 @@
           <a:p>
             <a:fld id="{040172E9-3018-4399-AF48-14950ACD53D7}" type="datetimeFigureOut">
               <a:rPr lang="en-US" smtClean="0"/>
-              <a:t>7/19/2022</a:t>
+              <a:t>7/24/2022</a:t>
             </a:fld>
             <a:endParaRPr lang="en-US"/>
           </a:p>
@@ -1303,7 +1303,7 @@
           <a:p>
             <a:fld id="{040172E9-3018-4399-AF48-14950ACD53D7}" type="datetimeFigureOut">
               <a:rPr lang="en-US" smtClean="0"/>
-              <a:t>7/19/2022</a:t>
+              <a:t>7/24/2022</a:t>
             </a:fld>
             <a:endParaRPr lang="en-US"/>
           </a:p>
@@ -1621,7 +1621,7 @@
           <a:p>
             <a:fld id="{040172E9-3018-4399-AF48-14950ACD53D7}" type="datetimeFigureOut">
               <a:rPr lang="en-US" smtClean="0"/>
-              <a:t>7/19/2022</a:t>
+              <a:t>7/24/2022</a:t>
             </a:fld>
             <a:endParaRPr lang="en-US"/>
           </a:p>
@@ -1923,7 +1923,7 @@
           <a:p>
             <a:fld id="{040172E9-3018-4399-AF48-14950ACD53D7}" type="datetimeFigureOut">
               <a:rPr lang="en-US" smtClean="0"/>
-              <a:t>7/19/2022</a:t>
+              <a:t>7/24/2022</a:t>
             </a:fld>
             <a:endParaRPr lang="en-US"/>
           </a:p>
@@ -2290,7 +2290,7 @@
           <a:p>
             <a:fld id="{040172E9-3018-4399-AF48-14950ACD53D7}" type="datetimeFigureOut">
               <a:rPr lang="en-US" smtClean="0"/>
-              <a:t>7/19/2022</a:t>
+              <a:t>7/24/2022</a:t>
             </a:fld>
             <a:endParaRPr lang="en-US"/>
           </a:p>
@@ -2464,7 +2464,7 @@
           <a:p>
             <a:fld id="{040172E9-3018-4399-AF48-14950ACD53D7}" type="datetimeFigureOut">
               <a:rPr lang="en-US" smtClean="0"/>
-              <a:t>7/19/2022</a:t>
+              <a:t>7/24/2022</a:t>
             </a:fld>
             <a:endParaRPr lang="en-US"/>
           </a:p>
@@ -2644,7 +2644,7 @@
           <a:p>
             <a:fld id="{040172E9-3018-4399-AF48-14950ACD53D7}" type="datetimeFigureOut">
               <a:rPr lang="en-US" smtClean="0"/>
-              <a:t>7/19/2022</a:t>
+              <a:t>7/24/2022</a:t>
             </a:fld>
             <a:endParaRPr lang="en-US"/>
           </a:p>
@@ -2814,7 +2814,7 @@
           <a:p>
             <a:fld id="{040172E9-3018-4399-AF48-14950ACD53D7}" type="datetimeFigureOut">
               <a:rPr lang="en-US" smtClean="0"/>
-              <a:t>7/19/2022</a:t>
+              <a:t>7/24/2022</a:t>
             </a:fld>
             <a:endParaRPr lang="en-US"/>
           </a:p>
@@ -3064,7 +3064,7 @@
           <a:p>
             <a:fld id="{040172E9-3018-4399-AF48-14950ACD53D7}" type="datetimeFigureOut">
               <a:rPr lang="en-US" smtClean="0"/>
-              <a:t>7/19/2022</a:t>
+              <a:t>7/24/2022</a:t>
             </a:fld>
             <a:endParaRPr lang="en-US"/>
           </a:p>
@@ -3300,7 +3300,7 @@
           <a:p>
             <a:fld id="{040172E9-3018-4399-AF48-14950ACD53D7}" type="datetimeFigureOut">
               <a:rPr lang="en-US" smtClean="0"/>
-              <a:t>7/19/2022</a:t>
+              <a:t>7/24/2022</a:t>
             </a:fld>
             <a:endParaRPr lang="en-US"/>
           </a:p>
@@ -3682,7 +3682,7 @@
           <a:p>
             <a:fld id="{040172E9-3018-4399-AF48-14950ACD53D7}" type="datetimeFigureOut">
               <a:rPr lang="en-US" smtClean="0"/>
-              <a:t>7/19/2022</a:t>
+              <a:t>7/24/2022</a:t>
             </a:fld>
             <a:endParaRPr lang="en-US"/>
           </a:p>
@@ -3800,7 +3800,7 @@
           <a:p>
             <a:fld id="{040172E9-3018-4399-AF48-14950ACD53D7}" type="datetimeFigureOut">
               <a:rPr lang="en-US" smtClean="0"/>
-              <a:t>7/19/2022</a:t>
+              <a:t>7/24/2022</a:t>
             </a:fld>
             <a:endParaRPr lang="en-US"/>
           </a:p>
@@ -3895,7 +3895,7 @@
           <a:p>
             <a:fld id="{040172E9-3018-4399-AF48-14950ACD53D7}" type="datetimeFigureOut">
               <a:rPr lang="en-US" smtClean="0"/>
-              <a:t>7/19/2022</a:t>
+              <a:t>7/24/2022</a:t>
             </a:fld>
             <a:endParaRPr lang="en-US"/>
           </a:p>
@@ -4150,7 +4150,7 @@
           <a:p>
             <a:fld id="{040172E9-3018-4399-AF48-14950ACD53D7}" type="datetimeFigureOut">
               <a:rPr lang="en-US" smtClean="0"/>
-              <a:t>7/19/2022</a:t>
+              <a:t>7/24/2022</a:t>
             </a:fld>
             <a:endParaRPr lang="en-US"/>
           </a:p>
@@ -4433,7 +4433,7 @@
           <a:p>
             <a:fld id="{040172E9-3018-4399-AF48-14950ACD53D7}" type="datetimeFigureOut">
               <a:rPr lang="en-US" smtClean="0"/>
-              <a:t>7/19/2022</a:t>
+              <a:t>7/24/2022</a:t>
             </a:fld>
             <a:endParaRPr lang="en-US"/>
           </a:p>
@@ -4839,7 +4839,7 @@
           <a:p>
             <a:fld id="{040172E9-3018-4399-AF48-14950ACD53D7}" type="datetimeFigureOut">
               <a:rPr lang="en-US" smtClean="0"/>
-              <a:t>7/19/2022</a:t>
+              <a:t>7/24/2022</a:t>
             </a:fld>
             <a:endParaRPr lang="en-US"/>
           </a:p>
@@ -5424,7 +5424,27 @@
                 <a:latin typeface="Aero Matics" panose="020B0803060101010101" pitchFamily="34" charset="-128"/>
                 <a:ea typeface="Aero Matics" panose="020B0803060101010101" pitchFamily="34" charset="-128"/>
               </a:rPr>
-              <a:t>Предсказание цены недвижимости</a:t>
+              <a:t>Предсказание </a:t>
+            </a:r>
+            <a:r>
+              <a:rPr lang="ru-RU" sz="5400" b="1" dirty="0" err="1">
+                <a:solidFill>
+                  <a:srgbClr val="002060"/>
+                </a:solidFill>
+                <a:latin typeface="Aero Matics" panose="020B0803060101010101" pitchFamily="34" charset="-128"/>
+                <a:ea typeface="Aero Matics" panose="020B0803060101010101" pitchFamily="34" charset="-128"/>
+              </a:rPr>
+              <a:t>ценЬ</a:t>
+            </a:r>
+            <a:r>
+              <a:rPr lang="ru-RU" sz="5400" b="1" dirty="0">
+                <a:solidFill>
+                  <a:srgbClr val="002060"/>
+                </a:solidFill>
+                <a:latin typeface="Aero Matics" panose="020B0803060101010101" pitchFamily="34" charset="-128"/>
+                <a:ea typeface="Aero Matics" panose="020B0803060101010101" pitchFamily="34" charset="-128"/>
+              </a:rPr>
+              <a:t> недвижимости</a:t>
             </a:r>
             <a:endParaRPr lang="en-US" sz="5400" b="1" dirty="0">
               <a:solidFill>
@@ -5869,7 +5889,7 @@
                 <a:solidFill>
                   <a:srgbClr val="002060"/>
                 </a:solidFill>
-                <a:latin typeface="Aero Matics" panose="020B0803060101010101" pitchFamily="34" charset="-128"/>
+                <a:latin typeface="AllodsWest" panose="02000000000000000000" pitchFamily="2" charset="0"/>
                 <a:ea typeface="Aero Matics" panose="020B0803060101010101" pitchFamily="34" charset="-128"/>
                 <a:cs typeface="Times New Roman" panose="02020603050405020304" pitchFamily="18" charset="0"/>
               </a:rPr>
@@ -5884,7 +5904,7 @@
               <a:solidFill>
                 <a:srgbClr val="002060"/>
               </a:solidFill>
-              <a:latin typeface="Aero Matics" panose="020B0803060101010101" pitchFamily="34" charset="-128"/>
+              <a:latin typeface="AllodsWest" panose="02000000000000000000" pitchFamily="2" charset="0"/>
               <a:ea typeface="Aero Matics" panose="020B0803060101010101" pitchFamily="34" charset="-128"/>
               <a:cs typeface="Times New Roman" panose="02020603050405020304" pitchFamily="18" charset="0"/>
             </a:endParaRPr>
@@ -5898,7 +5918,7 @@
                 <a:solidFill>
                   <a:srgbClr val="002060"/>
                 </a:solidFill>
-                <a:latin typeface="Aero Matics" panose="020B0803060101010101" pitchFamily="34" charset="-128"/>
+                <a:latin typeface="AllodsWest" panose="02000000000000000000" pitchFamily="2" charset="0"/>
                 <a:ea typeface="Aero Matics" panose="020B0803060101010101" pitchFamily="34" charset="-128"/>
                 <a:cs typeface="Times New Roman" panose="02020603050405020304" pitchFamily="18" charset="0"/>
               </a:rPr>
@@ -5909,7 +5929,7 @@
                 <a:solidFill>
                   <a:srgbClr val="002060"/>
                 </a:solidFill>
-                <a:latin typeface="Aero Matics" panose="020B0803060101010101" pitchFamily="34" charset="-128"/>
+                <a:latin typeface="AllodsWest" panose="02000000000000000000" pitchFamily="2" charset="0"/>
                 <a:ea typeface="Aero Matics" panose="020B0803060101010101" pitchFamily="34" charset="-128"/>
                 <a:cs typeface="Times New Roman" panose="02020603050405020304" pitchFamily="18" charset="0"/>
               </a:rPr>
@@ -5920,7 +5940,7 @@
                 <a:solidFill>
                   <a:srgbClr val="002060"/>
                 </a:solidFill>
-                <a:latin typeface="Aero Matics" panose="020B0803060101010101" pitchFamily="34" charset="-128"/>
+                <a:latin typeface="AllodsWest" panose="02000000000000000000" pitchFamily="2" charset="0"/>
                 <a:ea typeface="Aero Matics" panose="020B0803060101010101" pitchFamily="34" charset="-128"/>
                 <a:cs typeface="Times New Roman" panose="02020603050405020304" pitchFamily="18" charset="0"/>
               </a:rPr>
@@ -5931,7 +5951,7 @@
                 <a:solidFill>
                   <a:srgbClr val="002060"/>
                 </a:solidFill>
-                <a:latin typeface="Aero Matics" panose="020B0803060101010101" pitchFamily="34" charset="-128"/>
+                <a:latin typeface="AllodsWest" panose="02000000000000000000" pitchFamily="2" charset="0"/>
                 <a:ea typeface="Aero Matics" panose="020B0803060101010101" pitchFamily="34" charset="-128"/>
                 <a:cs typeface="Times New Roman" panose="02020603050405020304" pitchFamily="18" charset="0"/>
               </a:rPr>
@@ -5942,7 +5962,7 @@
                 <a:solidFill>
                   <a:srgbClr val="002060"/>
                 </a:solidFill>
-                <a:latin typeface="Aero Matics" panose="020B0803060101010101" pitchFamily="34" charset="-128"/>
+                <a:latin typeface="AllodsWest" panose="02000000000000000000" pitchFamily="2" charset="0"/>
                 <a:ea typeface="Aero Matics" panose="020B0803060101010101" pitchFamily="34" charset="-128"/>
                 <a:cs typeface="Times New Roman" panose="02020603050405020304" pitchFamily="18" charset="0"/>
               </a:rPr>
@@ -5958,7 +5978,7 @@
                 <a:solidFill>
                   <a:srgbClr val="002060"/>
                 </a:solidFill>
-                <a:latin typeface="Aero Matics" panose="020B0803060101010101" pitchFamily="34" charset="-128"/>
+                <a:latin typeface="AllodsWest" panose="02000000000000000000" pitchFamily="2" charset="0"/>
                 <a:ea typeface="Aero Matics" panose="020B0803060101010101" pitchFamily="34" charset="-128"/>
                 <a:cs typeface="Times New Roman" panose="02020603050405020304" pitchFamily="18" charset="0"/>
               </a:rPr>
@@ -5969,7 +5989,7 @@
                 <a:solidFill>
                   <a:srgbClr val="002060"/>
                 </a:solidFill>
-                <a:latin typeface="Aero Matics" panose="020B0803060101010101" pitchFamily="34" charset="-128"/>
+                <a:latin typeface="AllodsWest" panose="02000000000000000000" pitchFamily="2" charset="0"/>
                 <a:ea typeface="Aero Matics" panose="020B0803060101010101" pitchFamily="34" charset="-128"/>
                 <a:cs typeface="Times New Roman" panose="02020603050405020304" pitchFamily="18" charset="0"/>
               </a:rPr>
@@ -5980,7 +6000,7 @@
                 <a:solidFill>
                   <a:srgbClr val="002060"/>
                 </a:solidFill>
-                <a:latin typeface="Aero Matics" panose="020B0803060101010101" pitchFamily="34" charset="-128"/>
+                <a:latin typeface="AllodsWest" panose="02000000000000000000" pitchFamily="2" charset="0"/>
                 <a:ea typeface="Aero Matics" panose="020B0803060101010101" pitchFamily="34" charset="-128"/>
                 <a:cs typeface="Times New Roman" panose="02020603050405020304" pitchFamily="18" charset="0"/>
               </a:rPr>
@@ -5996,7 +6016,7 @@
                 <a:solidFill>
                   <a:srgbClr val="002060"/>
                 </a:solidFill>
-                <a:latin typeface="Aero Matics" panose="020B0803060101010101" pitchFamily="34" charset="-128"/>
+                <a:latin typeface="AllodsWest" panose="02000000000000000000" pitchFamily="2" charset="0"/>
                 <a:ea typeface="Aero Matics" panose="020B0803060101010101" pitchFamily="34" charset="-128"/>
                 <a:cs typeface="Times New Roman" panose="02020603050405020304" pitchFamily="18" charset="0"/>
               </a:rPr>
@@ -6007,7 +6027,7 @@
                 <a:solidFill>
                   <a:srgbClr val="002060"/>
                 </a:solidFill>
-                <a:latin typeface="Aero Matics" panose="020B0803060101010101" pitchFamily="34" charset="-128"/>
+                <a:latin typeface="AllodsWest" panose="02000000000000000000" pitchFamily="2" charset="0"/>
                 <a:ea typeface="Aero Matics" panose="020B0803060101010101" pitchFamily="34" charset="-128"/>
                 <a:cs typeface="Times New Roman" panose="02020603050405020304" pitchFamily="18" charset="0"/>
               </a:rPr>
@@ -6018,7 +6038,7 @@
                 <a:solidFill>
                   <a:srgbClr val="002060"/>
                 </a:solidFill>
-                <a:latin typeface="Aero Matics" panose="020B0803060101010101" pitchFamily="34" charset="-128"/>
+                <a:latin typeface="AllodsWest" panose="02000000000000000000" pitchFamily="2" charset="0"/>
                 <a:ea typeface="Aero Matics" panose="020B0803060101010101" pitchFamily="34" charset="-128"/>
                 <a:cs typeface="Times New Roman" panose="02020603050405020304" pitchFamily="18" charset="0"/>
               </a:rPr>
@@ -6029,7 +6049,7 @@
                 <a:solidFill>
                   <a:srgbClr val="002060"/>
                 </a:solidFill>
-                <a:latin typeface="Aero Matics" panose="020B0803060101010101" pitchFamily="34" charset="-128"/>
+                <a:latin typeface="AllodsWest" panose="02000000000000000000" pitchFamily="2" charset="0"/>
                 <a:ea typeface="Aero Matics" panose="020B0803060101010101" pitchFamily="34" charset="-128"/>
                 <a:cs typeface="Times New Roman" panose="02020603050405020304" pitchFamily="18" charset="0"/>
               </a:rPr>
@@ -6040,7 +6060,7 @@
                 <a:solidFill>
                   <a:srgbClr val="002060"/>
                 </a:solidFill>
-                <a:latin typeface="Aero Matics" panose="020B0803060101010101" pitchFamily="34" charset="-128"/>
+                <a:latin typeface="AllodsWest" panose="02000000000000000000" pitchFamily="2" charset="0"/>
                 <a:ea typeface="Aero Matics" panose="020B0803060101010101" pitchFamily="34" charset="-128"/>
                 <a:cs typeface="Times New Roman" panose="02020603050405020304" pitchFamily="18" charset="0"/>
               </a:rPr>
@@ -6051,7 +6071,7 @@
                 <a:solidFill>
                   <a:srgbClr val="002060"/>
                 </a:solidFill>
-                <a:latin typeface="Aero Matics" panose="020B0803060101010101" pitchFamily="34" charset="-128"/>
+                <a:latin typeface="AllodsWest" panose="02000000000000000000" pitchFamily="2" charset="0"/>
                 <a:ea typeface="Aero Matics" panose="020B0803060101010101" pitchFamily="34" charset="-128"/>
                 <a:cs typeface="Times New Roman" panose="02020603050405020304" pitchFamily="18" charset="0"/>
               </a:rPr>
@@ -6062,7 +6082,7 @@
                 <a:solidFill>
                   <a:srgbClr val="002060"/>
                 </a:solidFill>
-                <a:latin typeface="Aero Matics" panose="020B0803060101010101" pitchFamily="34" charset="-128"/>
+                <a:latin typeface="AllodsWest" panose="02000000000000000000" pitchFamily="2" charset="0"/>
                 <a:ea typeface="Aero Matics" panose="020B0803060101010101" pitchFamily="34" charset="-128"/>
                 <a:cs typeface="Times New Roman" panose="02020603050405020304" pitchFamily="18" charset="0"/>
               </a:rPr>
@@ -6073,7 +6093,7 @@
                 <a:solidFill>
                   <a:srgbClr val="002060"/>
                 </a:solidFill>
-                <a:latin typeface="Aero Matics" panose="020B0803060101010101" pitchFamily="34" charset="-128"/>
+                <a:latin typeface="AllodsWest" panose="02000000000000000000" pitchFamily="2" charset="0"/>
                 <a:ea typeface="Aero Matics" panose="020B0803060101010101" pitchFamily="34" charset="-128"/>
                 <a:cs typeface="Times New Roman" panose="02020603050405020304" pitchFamily="18" charset="0"/>
               </a:rPr>
@@ -6083,7 +6103,7 @@
               <a:solidFill>
                 <a:srgbClr val="002060"/>
               </a:solidFill>
-              <a:latin typeface="Aero Matics" panose="020B0803060101010101" pitchFamily="34" charset="-128"/>
+              <a:latin typeface="AllodsWest" panose="02000000000000000000" pitchFamily="2" charset="0"/>
               <a:ea typeface="Aero Matics" panose="020B0803060101010101" pitchFamily="34" charset="-128"/>
               <a:cs typeface="Times New Roman" panose="02020603050405020304" pitchFamily="18" charset="0"/>
             </a:endParaRPr>
@@ -6096,7 +6116,7 @@
               <a:solidFill>
                 <a:srgbClr val="002060"/>
               </a:solidFill>
-              <a:latin typeface="Aero Matics" panose="020B0803060101010101" pitchFamily="34" charset="-128"/>
+              <a:latin typeface="AllodsWest" panose="02000000000000000000" pitchFamily="2" charset="0"/>
               <a:ea typeface="Aero Matics" panose="020B0803060101010101" pitchFamily="34" charset="-128"/>
               <a:cs typeface="Times New Roman" panose="02020603050405020304" pitchFamily="18" charset="0"/>
             </a:endParaRPr>
@@ -6110,7 +6130,7 @@
                 <a:solidFill>
                   <a:srgbClr val="002060"/>
                 </a:solidFill>
-                <a:latin typeface="Aero Matics" panose="020B0803060101010101" pitchFamily="34" charset="-128"/>
+                <a:latin typeface="AllodsWest" panose="02000000000000000000" pitchFamily="2" charset="0"/>
                 <a:ea typeface="Aero Matics" panose="020B0803060101010101" pitchFamily="34" charset="-128"/>
                 <a:cs typeface="Times New Roman" panose="02020603050405020304" pitchFamily="18" charset="0"/>
               </a:rPr>
@@ -6121,7 +6141,7 @@
                 <a:solidFill>
                   <a:srgbClr val="002060"/>
                 </a:solidFill>
-                <a:latin typeface="Aero Matics" panose="020B0803060101010101" pitchFamily="34" charset="-128"/>
+                <a:latin typeface="AllodsWest" panose="02000000000000000000" pitchFamily="2" charset="0"/>
                 <a:ea typeface="Aero Matics" panose="020B0803060101010101" pitchFamily="34" charset="-128"/>
                 <a:cs typeface="Times New Roman" panose="02020603050405020304" pitchFamily="18" charset="0"/>
               </a:rPr>
@@ -6132,7 +6152,7 @@
                 <a:solidFill>
                   <a:srgbClr val="002060"/>
                 </a:solidFill>
-                <a:latin typeface="Aero Matics" panose="020B0803060101010101" pitchFamily="34" charset="-128"/>
+                <a:latin typeface="AllodsWest" panose="02000000000000000000" pitchFamily="2" charset="0"/>
                 <a:ea typeface="Aero Matics" panose="020B0803060101010101" pitchFamily="34" charset="-128"/>
                 <a:cs typeface="Times New Roman" panose="02020603050405020304" pitchFamily="18" charset="0"/>
               </a:rPr>
@@ -6439,7 +6459,7 @@
         <p:spPr>
           <a:xfrm>
             <a:off x="438539" y="766732"/>
-            <a:ext cx="11000792" cy="5632311"/>
+            <a:ext cx="11000792" cy="5078313"/>
           </a:xfrm>
           <a:prstGeom prst="rect">
             <a:avLst/>
@@ -6453,14 +6473,14 @@
           <a:lstStyle/>
           <a:p>
             <a:r>
-              <a:rPr lang="ru-RU" sz="2000" dirty="0">
+              <a:rPr lang="ru-RU" dirty="0">
                 <a:solidFill>
                   <a:schemeClr val="bg1">
                     <a:lumMod val="95000"/>
                     <a:lumOff val="5000"/>
                   </a:schemeClr>
                 </a:solidFill>
-                <a:latin typeface="+mj-lt"/>
+                <a:latin typeface="AllodsWest" panose="02000000000000000000" pitchFamily="2" charset="0"/>
                 <a:cs typeface="Times New Roman" panose="02020603050405020304" pitchFamily="18" charset="0"/>
               </a:rPr>
               <a:t>Выполнение работы проводилось в несколько этапов:</a:t>
@@ -6471,14 +6491,14 @@
               <a:buAutoNum type="arabicPeriod"/>
             </a:pPr>
             <a:r>
-              <a:rPr lang="ru-RU" sz="2000" dirty="0">
+              <a:rPr lang="ru-RU" dirty="0">
                 <a:solidFill>
                   <a:schemeClr val="bg1">
                     <a:lumMod val="95000"/>
                     <a:lumOff val="5000"/>
                   </a:schemeClr>
                 </a:solidFill>
-                <a:latin typeface="+mj-lt"/>
+                <a:latin typeface="AllodsWest" panose="02000000000000000000" pitchFamily="2" charset="0"/>
                 <a:cs typeface="Times New Roman" panose="02020603050405020304" pitchFamily="18" charset="0"/>
               </a:rPr>
               <a:t>Первичный анализ признаков. Основные признаки были визуализированы при помощи графиков и представлены в ноутбуке</a:t>
@@ -6489,14 +6509,14 @@
               <a:buAutoNum type="arabicPeriod"/>
             </a:pPr>
             <a:r>
-              <a:rPr lang="ru-RU" sz="2000" dirty="0">
+              <a:rPr lang="ru-RU" dirty="0">
                 <a:solidFill>
                   <a:schemeClr val="bg1">
                     <a:lumMod val="95000"/>
                     <a:lumOff val="5000"/>
                   </a:schemeClr>
                 </a:solidFill>
-                <a:latin typeface="+mj-lt"/>
+                <a:latin typeface="AllodsWest" panose="02000000000000000000" pitchFamily="2" charset="0"/>
                 <a:cs typeface="Times New Roman" panose="02020603050405020304" pitchFamily="18" charset="0"/>
               </a:rPr>
               <a:t>Обработка признаков. Для этой цели были написаны несколько функций, обеспечивающий фильтрацию исходных данных, заполнение пропущенных значений данными усреднёнными по району</a:t>
@@ -6507,39 +6527,39 @@
               <a:buAutoNum type="arabicPeriod"/>
             </a:pPr>
             <a:r>
-              <a:rPr lang="ru-RU" sz="2000" dirty="0">
+              <a:rPr lang="ru-RU" dirty="0">
                 <a:solidFill>
                   <a:schemeClr val="bg1">
                     <a:lumMod val="95000"/>
                     <a:lumOff val="5000"/>
                   </a:schemeClr>
                 </a:solidFill>
-                <a:latin typeface="+mj-lt"/>
+                <a:latin typeface="AllodsWest" panose="02000000000000000000" pitchFamily="2" charset="0"/>
                 <a:cs typeface="Times New Roman" panose="02020603050405020304" pitchFamily="18" charset="0"/>
               </a:rPr>
               <a:t>Первичное обучение модели. Была использована библиотека машинного обучения </a:t>
             </a:r>
             <a:r>
-              <a:rPr lang="en-US" sz="2000" dirty="0" err="1">
+              <a:rPr lang="en-US" dirty="0" err="1">
                 <a:solidFill>
                   <a:schemeClr val="bg1">
                     <a:lumMod val="95000"/>
                     <a:lumOff val="5000"/>
                   </a:schemeClr>
                 </a:solidFill>
-                <a:latin typeface="+mj-lt"/>
+                <a:latin typeface="AllodsWest" panose="02000000000000000000" pitchFamily="2" charset="0"/>
                 <a:cs typeface="Times New Roman" panose="02020603050405020304" pitchFamily="18" charset="0"/>
               </a:rPr>
               <a:t>CatBoost</a:t>
             </a:r>
-            <a:endParaRPr lang="en-US" sz="2000" dirty="0">
+            <a:endParaRPr lang="en-US" dirty="0">
               <a:solidFill>
                 <a:schemeClr val="bg1">
                   <a:lumMod val="95000"/>
                   <a:lumOff val="5000"/>
                 </a:schemeClr>
               </a:solidFill>
-              <a:latin typeface="+mj-lt"/>
+              <a:latin typeface="AllodsWest" panose="02000000000000000000" pitchFamily="2" charset="0"/>
               <a:cs typeface="Times New Roman" panose="02020603050405020304" pitchFamily="18" charset="0"/>
             </a:endParaRPr>
           </a:p>
@@ -6548,14 +6568,14 @@
               <a:buAutoNum type="arabicPeriod"/>
             </a:pPr>
             <a:r>
-              <a:rPr lang="ru-RU" sz="2000" dirty="0">
+              <a:rPr lang="ru-RU" dirty="0">
                 <a:solidFill>
                   <a:schemeClr val="bg1">
                     <a:lumMod val="95000"/>
                     <a:lumOff val="5000"/>
                   </a:schemeClr>
                 </a:solidFill>
-                <a:latin typeface="+mj-lt"/>
+                <a:latin typeface="AllodsWest" panose="02000000000000000000" pitchFamily="2" charset="0"/>
                 <a:cs typeface="Times New Roman" panose="02020603050405020304" pitchFamily="18" charset="0"/>
               </a:rPr>
               <a:t>На основе обученной модели были выполнены предсказания.</a:t>
@@ -6566,14 +6586,14 @@
               <a:buAutoNum type="arabicPeriod"/>
             </a:pPr>
             <a:r>
-              <a:rPr lang="ru-RU" sz="2000" dirty="0">
+              <a:rPr lang="ru-RU" dirty="0">
                 <a:solidFill>
                   <a:schemeClr val="bg1">
                     <a:lumMod val="95000"/>
                     <a:lumOff val="5000"/>
                   </a:schemeClr>
                 </a:solidFill>
-                <a:latin typeface="+mj-lt"/>
+                <a:latin typeface="AllodsWest" panose="02000000000000000000" pitchFamily="2" charset="0"/>
                 <a:cs typeface="Times New Roman" panose="02020603050405020304" pitchFamily="18" charset="0"/>
               </a:rPr>
               <a:t>После обучения был проеден анализ важности признаков</a:t>
@@ -6584,40 +6604,40 @@
               <a:buAutoNum type="arabicPeriod"/>
             </a:pPr>
             <a:r>
-              <a:rPr lang="ru-RU" sz="2000" dirty="0">
+              <a:rPr lang="ru-RU" dirty="0">
                 <a:solidFill>
                   <a:schemeClr val="bg1">
                     <a:lumMod val="95000"/>
                     <a:lumOff val="5000"/>
                   </a:schemeClr>
                 </a:solidFill>
-                <a:latin typeface="+mj-lt"/>
+                <a:latin typeface="AllodsWest" panose="02000000000000000000" pitchFamily="2" charset="0"/>
                 <a:cs typeface="Times New Roman" panose="02020603050405020304" pitchFamily="18" charset="0"/>
               </a:rPr>
               <a:t>По результатам анализа важности признаков исходный </a:t>
             </a:r>
             <a:r>
-              <a:rPr lang="ru-RU" sz="2000" dirty="0" err="1">
+              <a:rPr lang="ru-RU" dirty="0" err="1">
                 <a:solidFill>
                   <a:schemeClr val="bg1">
                     <a:lumMod val="95000"/>
                     <a:lumOff val="5000"/>
                   </a:schemeClr>
                 </a:solidFill>
-                <a:latin typeface="+mj-lt"/>
+                <a:latin typeface="AllodsWest" panose="02000000000000000000" pitchFamily="2" charset="0"/>
                 <a:cs typeface="Times New Roman" panose="02020603050405020304" pitchFamily="18" charset="0"/>
               </a:rPr>
               <a:t>датасет</a:t>
             </a:r>
             <a:r>
-              <a:rPr lang="ru-RU" sz="2000" dirty="0">
+              <a:rPr lang="ru-RU" dirty="0">
                 <a:solidFill>
                   <a:schemeClr val="bg1">
                     <a:lumMod val="95000"/>
                     <a:lumOff val="5000"/>
                   </a:schemeClr>
                 </a:solidFill>
-                <a:latin typeface="+mj-lt"/>
+                <a:latin typeface="AllodsWest" panose="02000000000000000000" pitchFamily="2" charset="0"/>
                 <a:cs typeface="Times New Roman" panose="02020603050405020304" pitchFamily="18" charset="0"/>
               </a:rPr>
               <a:t> был трансформирован для удаления признаков имеющих низкую важность.</a:t>
@@ -6628,14 +6648,14 @@
               <a:buAutoNum type="arabicPeriod"/>
             </a:pPr>
             <a:r>
-              <a:rPr lang="ru-RU" sz="2000" dirty="0">
+              <a:rPr lang="ru-RU" dirty="0">
                 <a:solidFill>
                   <a:schemeClr val="bg1">
                     <a:lumMod val="95000"/>
                     <a:lumOff val="5000"/>
                   </a:schemeClr>
                 </a:solidFill>
-                <a:latin typeface="+mj-lt"/>
+                <a:latin typeface="AllodsWest" panose="02000000000000000000" pitchFamily="2" charset="0"/>
                 <a:cs typeface="Times New Roman" panose="02020603050405020304" pitchFamily="18" charset="0"/>
               </a:rPr>
               <a:t>С использованием отредактированного набора признаков еще раз была обучена модель и получены предсказания цены.</a:t>
@@ -6646,92 +6666,92 @@
               <a:buAutoNum type="arabicPeriod"/>
             </a:pPr>
             <a:r>
-              <a:rPr lang="ru-RU" sz="2000" dirty="0">
+              <a:rPr lang="ru-RU" dirty="0">
                 <a:solidFill>
                   <a:schemeClr val="bg1">
                     <a:lumMod val="95000"/>
                     <a:lumOff val="5000"/>
                   </a:schemeClr>
                 </a:solidFill>
-                <a:latin typeface="+mj-lt"/>
+                <a:latin typeface="AllodsWest" panose="02000000000000000000" pitchFamily="2" charset="0"/>
                 <a:cs typeface="Times New Roman" panose="02020603050405020304" pitchFamily="18" charset="0"/>
               </a:rPr>
               <a:t>Был сформирован обновленный </a:t>
             </a:r>
             <a:r>
-              <a:rPr lang="ru-RU" sz="2000" dirty="0" err="1">
+              <a:rPr lang="ru-RU" dirty="0" err="1">
                 <a:solidFill>
                   <a:schemeClr val="bg1">
                     <a:lumMod val="95000"/>
                     <a:lumOff val="5000"/>
                   </a:schemeClr>
                 </a:solidFill>
-                <a:latin typeface="+mj-lt"/>
+                <a:latin typeface="AllodsWest" panose="02000000000000000000" pitchFamily="2" charset="0"/>
                 <a:cs typeface="Times New Roman" panose="02020603050405020304" pitchFamily="18" charset="0"/>
               </a:rPr>
               <a:t>датасет</a:t>
             </a:r>
             <a:r>
-              <a:rPr lang="ru-RU" sz="2000" dirty="0">
+              <a:rPr lang="ru-RU" dirty="0">
                 <a:solidFill>
                   <a:schemeClr val="bg1">
                     <a:lumMod val="95000"/>
                     <a:lumOff val="5000"/>
                   </a:schemeClr>
                 </a:solidFill>
-                <a:latin typeface="+mj-lt"/>
+                <a:latin typeface="AllodsWest" panose="02000000000000000000" pitchFamily="2" charset="0"/>
                 <a:cs typeface="Times New Roman" panose="02020603050405020304" pitchFamily="18" charset="0"/>
               </a:rPr>
               <a:t> с использованием макроэкономических показателей. </a:t>
             </a:r>
             <a:r>
-              <a:rPr lang="ru-RU" sz="2000" dirty="0" err="1">
+              <a:rPr lang="ru-RU" dirty="0" err="1">
                 <a:solidFill>
                   <a:schemeClr val="bg1">
                     <a:lumMod val="95000"/>
                     <a:lumOff val="5000"/>
                   </a:schemeClr>
                 </a:solidFill>
-                <a:latin typeface="+mj-lt"/>
+                <a:latin typeface="AllodsWest" panose="02000000000000000000" pitchFamily="2" charset="0"/>
                 <a:cs typeface="Times New Roman" panose="02020603050405020304" pitchFamily="18" charset="0"/>
               </a:rPr>
               <a:t>Датасет</a:t>
             </a:r>
             <a:r>
-              <a:rPr lang="ru-RU" sz="2000" dirty="0">
+              <a:rPr lang="ru-RU" dirty="0">
                 <a:solidFill>
                   <a:schemeClr val="bg1">
                     <a:lumMod val="95000"/>
                     <a:lumOff val="5000"/>
                   </a:schemeClr>
                 </a:solidFill>
-                <a:latin typeface="+mj-lt"/>
+                <a:latin typeface="AllodsWest" panose="02000000000000000000" pitchFamily="2" charset="0"/>
                 <a:cs typeface="Times New Roman" panose="02020603050405020304" pitchFamily="18" charset="0"/>
               </a:rPr>
               <a:t> был обработан  и на основании этого </a:t>
             </a:r>
             <a:r>
-              <a:rPr lang="ru-RU" sz="2000" dirty="0" err="1">
+              <a:rPr lang="ru-RU" dirty="0" err="1">
                 <a:solidFill>
                   <a:schemeClr val="bg1">
                     <a:lumMod val="95000"/>
                     <a:lumOff val="5000"/>
                   </a:schemeClr>
                 </a:solidFill>
-                <a:latin typeface="+mj-lt"/>
+                <a:latin typeface="AllodsWest" panose="02000000000000000000" pitchFamily="2" charset="0"/>
                 <a:cs typeface="Times New Roman" panose="02020603050405020304" pitchFamily="18" charset="0"/>
               </a:rPr>
               <a:t>датасета</a:t>
             </a:r>
             <a:r>
-              <a:rPr lang="ru-RU" sz="2000" dirty="0">
+              <a:rPr lang="ru-RU" dirty="0">
                 <a:solidFill>
                   <a:schemeClr val="bg1">
                     <a:lumMod val="95000"/>
                     <a:lumOff val="5000"/>
                   </a:schemeClr>
                 </a:solidFill>
-                <a:latin typeface="+mj-lt"/>
+                <a:latin typeface="AllodsWest" panose="02000000000000000000" pitchFamily="2" charset="0"/>
                 <a:cs typeface="Times New Roman" panose="02020603050405020304" pitchFamily="18" charset="0"/>
               </a:rPr>
               <a:t> была обучена модель и получены предсказания.</a:t>
@@ -6742,14 +6762,14 @@
               <a:buAutoNum type="arabicPeriod"/>
             </a:pPr>
             <a:r>
-              <a:rPr lang="ru-RU" sz="2000" dirty="0">
+              <a:rPr lang="ru-RU" dirty="0">
                 <a:solidFill>
                   <a:schemeClr val="bg1">
                     <a:lumMod val="95000"/>
                     <a:lumOff val="5000"/>
                   </a:schemeClr>
                 </a:solidFill>
-                <a:latin typeface="+mj-lt"/>
+                <a:latin typeface="AllodsWest" panose="02000000000000000000" pitchFamily="2" charset="0"/>
                 <a:cs typeface="Times New Roman" panose="02020603050405020304" pitchFamily="18" charset="0"/>
               </a:rPr>
               <a:t>Было выполнено сравнение результатов, полученных для трех вариантов модели.</a:t>

</xml_diff>